<commit_message>
fix(modifier): remove remaining text on setText
</commit_message>
<xml_diff>
--- a/__tests__/pptx-templates/TextReplace.pptx
+++ b/__tests__/pptx-templates/TextReplace.pptx
@@ -3328,7 +3328,7 @@
       </p:grpSpPr>
       <p:sp>
         <p:nvSpPr>
-          <p:cNvPr id="9" name="Text">
+          <p:cNvPr id="9" name="replaceText">
             <a:extLst>
               <a:ext uri="{FF2B5EF4-FFF2-40B4-BE49-F238E27FC236}">
                 <a16:creationId xmlns:a16="http://schemas.microsoft.com/office/drawing/2014/main" id="{145AC1A0-5801-4BE8-B0E4-E02A0C611D24}"/>
@@ -3389,7 +3389,7 @@
             </a:r>
             <a:r>
               <a:rPr lang="de-DE" sz="1600"/>
-              <a:t>${replace}</a:t>
+              <a:t>{{replace}}</a:t>
             </a:r>
             <a:r>
               <a:rPr lang="de-DE"/>
@@ -3401,7 +3401,7 @@
                   <a:schemeClr val="accent2"/>
                 </a:solidFill>
               </a:rPr>
-              <a:t>${by}.</a:t>
+              <a:t>{{by}}.</a:t>
             </a:r>
           </a:p>
           <a:p>
@@ -3427,7 +3427,7 @@
             </a:r>
             <a:r>
               <a:rPr lang="de-DE"/>
-              <a:t> everywhere. ${replac</a:t>
+              <a:t> everywhere. {{replac</a:t>
             </a:r>
             <a:r>
               <a:rPr lang="de-DE">
@@ -3439,7 +3439,7 @@
             </a:r>
             <a:r>
               <a:rPr lang="de-DE"/>
-              <a:t>ment}</a:t>
+              <a:t>ment}}</a:t>
             </a:r>
           </a:p>
           <a:p>
@@ -3472,7 +3472,73 @@
           <a:p>
             <a:r>
               <a:rPr lang="de-DE"/>
-              <a:t>${replace}${by}</a:t>
+              <a:t>{{replace}} → {{by}}</a:t>
+            </a:r>
+          </a:p>
+        </p:txBody>
+      </p:sp>
+      <p:sp>
+        <p:nvSpPr>
+          <p:cNvPr id="3" name="setText">
+            <a:extLst>
+              <a:ext uri="{FF2B5EF4-FFF2-40B4-BE49-F238E27FC236}">
+                <a16:creationId xmlns:a16="http://schemas.microsoft.com/office/drawing/2014/main" id="{17F3492B-6E3D-41E7-9B0D-8FD08A14F0EE}"/>
+              </a:ext>
+            </a:extLst>
+          </p:cNvPr>
+          <p:cNvSpPr txBox="1"/>
+          <p:nvPr/>
+        </p:nvSpPr>
+        <p:spPr>
+          <a:xfrm>
+            <a:off x="2068830" y="486459"/>
+            <a:ext cx="7566660" cy="400110"/>
+          </a:xfrm>
+          <a:prstGeom prst="rect">
+            <a:avLst/>
+          </a:prstGeom>
+          <a:noFill/>
+        </p:spPr>
+        <p:txBody>
+          <a:bodyPr wrap="square" rtlCol="0">
+            <a:spAutoFit/>
+          </a:bodyPr>
+          <a:lstStyle/>
+          <a:p>
+            <a:r>
+              <a:rPr lang="de-DE" sz="2000" i="1">
+                <a:solidFill>
+                  <a:schemeClr val="accent6"/>
+                </a:solidFill>
+              </a:rPr>
+              <a:t>This</a:t>
+            </a:r>
+            <a:r>
+              <a:rPr lang="de-DE" sz="2000"/>
+              <a:t> is test</a:t>
+            </a:r>
+            <a:r>
+              <a:rPr lang="de-DE"/>
+              <a:t> </a:t>
+            </a:r>
+            <a:r>
+              <a:rPr lang="de-DE" b="1"/>
+              <a:t>content</a:t>
+            </a:r>
+            <a:r>
+              <a:rPr lang="de-DE"/>
+              <a:t>. It will be completely replaced by </a:t>
+            </a:r>
+            <a:r>
+              <a:rPr lang="de-DE">
+                <a:latin typeface="Courier New" panose="02070309020205020404" pitchFamily="49" charset="0"/>
+                <a:cs typeface="Courier New" panose="02070309020205020404" pitchFamily="49" charset="0"/>
+              </a:rPr>
+              <a:t>setText</a:t>
+            </a:r>
+            <a:r>
+              <a:rPr lang="de-DE"/>
+              <a:t>.</a:t>
             </a:r>
           </a:p>
         </p:txBody>

</xml_diff>

<commit_message>
fix(modify): improve tag matching/merging across blocks (wip)
</commit_message>
<xml_diff>
--- a/__tests__/pptx-templates/TextReplace.pptx
+++ b/__tests__/pptx-templates/TextReplace.pptx
@@ -259,7 +259,7 @@
           <a:p>
             <a:fld id="{8FB60A0F-5ED1-45ED-A5D5-DB038E6B70D9}" type="datetimeFigureOut">
               <a:rPr lang="de-DE" smtClean="0"/>
-              <a:t>22.11.2021</a:t>
+              <a:t>23.11.2021</a:t>
             </a:fld>
             <a:endParaRPr lang="de-DE"/>
           </a:p>
@@ -457,7 +457,7 @@
           <a:p>
             <a:fld id="{8FB60A0F-5ED1-45ED-A5D5-DB038E6B70D9}" type="datetimeFigureOut">
               <a:rPr lang="de-DE" smtClean="0"/>
-              <a:t>22.11.2021</a:t>
+              <a:t>23.11.2021</a:t>
             </a:fld>
             <a:endParaRPr lang="de-DE"/>
           </a:p>
@@ -665,7 +665,7 @@
           <a:p>
             <a:fld id="{8FB60A0F-5ED1-45ED-A5D5-DB038E6B70D9}" type="datetimeFigureOut">
               <a:rPr lang="de-DE" smtClean="0"/>
-              <a:t>22.11.2021</a:t>
+              <a:t>23.11.2021</a:t>
             </a:fld>
             <a:endParaRPr lang="de-DE"/>
           </a:p>
@@ -863,7 +863,7 @@
           <a:p>
             <a:fld id="{8FB60A0F-5ED1-45ED-A5D5-DB038E6B70D9}" type="datetimeFigureOut">
               <a:rPr lang="de-DE" smtClean="0"/>
-              <a:t>22.11.2021</a:t>
+              <a:t>23.11.2021</a:t>
             </a:fld>
             <a:endParaRPr lang="de-DE"/>
           </a:p>
@@ -1138,7 +1138,7 @@
           <a:p>
             <a:fld id="{8FB60A0F-5ED1-45ED-A5D5-DB038E6B70D9}" type="datetimeFigureOut">
               <a:rPr lang="de-DE" smtClean="0"/>
-              <a:t>22.11.2021</a:t>
+              <a:t>23.11.2021</a:t>
             </a:fld>
             <a:endParaRPr lang="de-DE"/>
           </a:p>
@@ -1403,7 +1403,7 @@
           <a:p>
             <a:fld id="{8FB60A0F-5ED1-45ED-A5D5-DB038E6B70D9}" type="datetimeFigureOut">
               <a:rPr lang="de-DE" smtClean="0"/>
-              <a:t>22.11.2021</a:t>
+              <a:t>23.11.2021</a:t>
             </a:fld>
             <a:endParaRPr lang="de-DE"/>
           </a:p>
@@ -1815,7 +1815,7 @@
           <a:p>
             <a:fld id="{8FB60A0F-5ED1-45ED-A5D5-DB038E6B70D9}" type="datetimeFigureOut">
               <a:rPr lang="de-DE" smtClean="0"/>
-              <a:t>22.11.2021</a:t>
+              <a:t>23.11.2021</a:t>
             </a:fld>
             <a:endParaRPr lang="de-DE"/>
           </a:p>
@@ -1956,7 +1956,7 @@
           <a:p>
             <a:fld id="{8FB60A0F-5ED1-45ED-A5D5-DB038E6B70D9}" type="datetimeFigureOut">
               <a:rPr lang="de-DE" smtClean="0"/>
-              <a:t>22.11.2021</a:t>
+              <a:t>23.11.2021</a:t>
             </a:fld>
             <a:endParaRPr lang="de-DE"/>
           </a:p>
@@ -2069,7 +2069,7 @@
           <a:p>
             <a:fld id="{8FB60A0F-5ED1-45ED-A5D5-DB038E6B70D9}" type="datetimeFigureOut">
               <a:rPr lang="de-DE" smtClean="0"/>
-              <a:t>22.11.2021</a:t>
+              <a:t>23.11.2021</a:t>
             </a:fld>
             <a:endParaRPr lang="de-DE"/>
           </a:p>
@@ -2380,7 +2380,7 @@
           <a:p>
             <a:fld id="{8FB60A0F-5ED1-45ED-A5D5-DB038E6B70D9}" type="datetimeFigureOut">
               <a:rPr lang="de-DE" smtClean="0"/>
-              <a:t>22.11.2021</a:t>
+              <a:t>23.11.2021</a:t>
             </a:fld>
             <a:endParaRPr lang="de-DE"/>
           </a:p>
@@ -2668,7 +2668,7 @@
           <a:p>
             <a:fld id="{8FB60A0F-5ED1-45ED-A5D5-DB038E6B70D9}" type="datetimeFigureOut">
               <a:rPr lang="de-DE" smtClean="0"/>
-              <a:t>22.11.2021</a:t>
+              <a:t>23.11.2021</a:t>
             </a:fld>
             <a:endParaRPr lang="de-DE"/>
           </a:p>
@@ -2909,7 +2909,7 @@
           <a:p>
             <a:fld id="{8FB60A0F-5ED1-45ED-A5D5-DB038E6B70D9}" type="datetimeFigureOut">
               <a:rPr lang="de-DE" smtClean="0"/>
-              <a:t>22.11.2021</a:t>
+              <a:t>23.11.2021</a:t>
             </a:fld>
             <a:endParaRPr lang="de-DE"/>
           </a:p>
@@ -3401,7 +3401,26 @@
                   <a:schemeClr val="accent2"/>
                 </a:solidFill>
               </a:rPr>
-              <a:t>{{by}}.</a:t>
+              <a:t>{{by}} </a:t>
+            </a:r>
+            <a:r>
+              <a:rPr lang="de-DE">
+                <a:solidFill>
+                  <a:schemeClr val="accent5">
+                    <a:lumMod val="60000"/>
+                    <a:lumOff val="40000"/>
+                  </a:schemeClr>
+                </a:solidFill>
+              </a:rPr>
+              <a:t>and nothing else</a:t>
+            </a:r>
+            <a:r>
+              <a:rPr lang="de-DE">
+                <a:solidFill>
+                  <a:schemeClr val="accent2"/>
+                </a:solidFill>
+              </a:rPr>
+              <a:t>.</a:t>
             </a:r>
           </a:p>
           <a:p>
@@ -3427,19 +3446,7 @@
             </a:r>
             <a:r>
               <a:rPr lang="de-DE"/>
-              <a:t> everywhere. {{replac</a:t>
-            </a:r>
-            <a:r>
-              <a:rPr lang="de-DE">
-                <a:solidFill>
-                  <a:srgbClr val="00B0F0"/>
-                </a:solidFill>
-              </a:rPr>
-              <a:t>e</a:t>
-            </a:r>
-            <a:r>
-              <a:rPr lang="de-DE"/>
-              <a:t>ment}}</a:t>
+              <a:t> everywhere.  {{replacement}}</a:t>
             </a:r>
           </a:p>
           <a:p>
@@ -3472,7 +3479,19 @@
           <a:p>
             <a:r>
               <a:rPr lang="de-DE"/>
-              <a:t>{{replace}} → {{by}}</a:t>
+              <a:t>{{replace}} → {{replace}} → abc {{b</a:t>
+            </a:r>
+            <a:r>
+              <a:rPr lang="de-DE">
+                <a:solidFill>
+                  <a:srgbClr val="FF0000"/>
+                </a:solidFill>
+              </a:rPr>
+              <a:t>y</a:t>
+            </a:r>
+            <a:r>
+              <a:rPr lang="de-DE"/>
+              <a:t>}}</a:t>
             </a:r>
           </a:p>
         </p:txBody>

</xml_diff>

<commit_message>
test(text): use replaceText to set bulleted lists; see #101
</commit_message>
<xml_diff>
--- a/__tests__/pptx-templates/TextReplace.pptx
+++ b/__tests__/pptx-templates/TextReplace.pptx
@@ -6,6 +6,7 @@
   </p:sldMasterIdLst>
   <p:sldIdLst>
     <p:sldId id="256" r:id="rId2"/>
+    <p:sldId id="257" r:id="rId3"/>
   </p:sldIdLst>
   <p:sldSz cx="12192000" cy="6858000"/>
   <p:notesSz cx="6858000" cy="9144000"/>
@@ -259,7 +260,7 @@
           <a:p>
             <a:fld id="{8FB60A0F-5ED1-45ED-A5D5-DB038E6B70D9}" type="datetimeFigureOut">
               <a:rPr lang="de-DE" smtClean="0"/>
-              <a:t>23.11.2021</a:t>
+              <a:t>25.04.2024</a:t>
             </a:fld>
             <a:endParaRPr lang="de-DE"/>
           </a:p>
@@ -457,7 +458,7 @@
           <a:p>
             <a:fld id="{8FB60A0F-5ED1-45ED-A5D5-DB038E6B70D9}" type="datetimeFigureOut">
               <a:rPr lang="de-DE" smtClean="0"/>
-              <a:t>23.11.2021</a:t>
+              <a:t>25.04.2024</a:t>
             </a:fld>
             <a:endParaRPr lang="de-DE"/>
           </a:p>
@@ -665,7 +666,7 @@
           <a:p>
             <a:fld id="{8FB60A0F-5ED1-45ED-A5D5-DB038E6B70D9}" type="datetimeFigureOut">
               <a:rPr lang="de-DE" smtClean="0"/>
-              <a:t>23.11.2021</a:t>
+              <a:t>25.04.2024</a:t>
             </a:fld>
             <a:endParaRPr lang="de-DE"/>
           </a:p>
@@ -863,7 +864,7 @@
           <a:p>
             <a:fld id="{8FB60A0F-5ED1-45ED-A5D5-DB038E6B70D9}" type="datetimeFigureOut">
               <a:rPr lang="de-DE" smtClean="0"/>
-              <a:t>23.11.2021</a:t>
+              <a:t>25.04.2024</a:t>
             </a:fld>
             <a:endParaRPr lang="de-DE"/>
           </a:p>
@@ -1138,7 +1139,7 @@
           <a:p>
             <a:fld id="{8FB60A0F-5ED1-45ED-A5D5-DB038E6B70D9}" type="datetimeFigureOut">
               <a:rPr lang="de-DE" smtClean="0"/>
-              <a:t>23.11.2021</a:t>
+              <a:t>25.04.2024</a:t>
             </a:fld>
             <a:endParaRPr lang="de-DE"/>
           </a:p>
@@ -1403,7 +1404,7 @@
           <a:p>
             <a:fld id="{8FB60A0F-5ED1-45ED-A5D5-DB038E6B70D9}" type="datetimeFigureOut">
               <a:rPr lang="de-DE" smtClean="0"/>
-              <a:t>23.11.2021</a:t>
+              <a:t>25.04.2024</a:t>
             </a:fld>
             <a:endParaRPr lang="de-DE"/>
           </a:p>
@@ -1815,7 +1816,7 @@
           <a:p>
             <a:fld id="{8FB60A0F-5ED1-45ED-A5D5-DB038E6B70D9}" type="datetimeFigureOut">
               <a:rPr lang="de-DE" smtClean="0"/>
-              <a:t>23.11.2021</a:t>
+              <a:t>25.04.2024</a:t>
             </a:fld>
             <a:endParaRPr lang="de-DE"/>
           </a:p>
@@ -1956,7 +1957,7 @@
           <a:p>
             <a:fld id="{8FB60A0F-5ED1-45ED-A5D5-DB038E6B70D9}" type="datetimeFigureOut">
               <a:rPr lang="de-DE" smtClean="0"/>
-              <a:t>23.11.2021</a:t>
+              <a:t>25.04.2024</a:t>
             </a:fld>
             <a:endParaRPr lang="de-DE"/>
           </a:p>
@@ -2069,7 +2070,7 @@
           <a:p>
             <a:fld id="{8FB60A0F-5ED1-45ED-A5D5-DB038E6B70D9}" type="datetimeFigureOut">
               <a:rPr lang="de-DE" smtClean="0"/>
-              <a:t>23.11.2021</a:t>
+              <a:t>25.04.2024</a:t>
             </a:fld>
             <a:endParaRPr lang="de-DE"/>
           </a:p>
@@ -2380,7 +2381,7 @@
           <a:p>
             <a:fld id="{8FB60A0F-5ED1-45ED-A5D5-DB038E6B70D9}" type="datetimeFigureOut">
               <a:rPr lang="de-DE" smtClean="0"/>
-              <a:t>23.11.2021</a:t>
+              <a:t>25.04.2024</a:t>
             </a:fld>
             <a:endParaRPr lang="de-DE"/>
           </a:p>
@@ -2668,7 +2669,7 @@
           <a:p>
             <a:fld id="{8FB60A0F-5ED1-45ED-A5D5-DB038E6B70D9}" type="datetimeFigureOut">
               <a:rPr lang="de-DE" smtClean="0"/>
-              <a:t>23.11.2021</a:t>
+              <a:t>25.04.2024</a:t>
             </a:fld>
             <a:endParaRPr lang="de-DE"/>
           </a:p>
@@ -2909,7 +2910,7 @@
           <a:p>
             <a:fld id="{8FB60A0F-5ED1-45ED-A5D5-DB038E6B70D9}" type="datetimeFigureOut">
               <a:rPr lang="de-DE" smtClean="0"/>
-              <a:t>23.11.2021</a:t>
+              <a:t>25.04.2024</a:t>
             </a:fld>
             <a:endParaRPr lang="de-DE"/>
           </a:p>
@@ -3563,6 +3564,95 @@
 </p:sld>
 </file>
 
+<file path=ppt/slides/slide2.xml><?xml version="1.0" encoding="utf-8"?>
+<p:sld xmlns:a="http://schemas.openxmlformats.org/drawingml/2006/main" xmlns:r="http://schemas.openxmlformats.org/officeDocument/2006/relationships" xmlns:p="http://schemas.openxmlformats.org/presentationml/2006/main">
+  <p:cSld>
+    <p:spTree>
+      <p:nvGrpSpPr>
+        <p:cNvPr id="1" name=""/>
+        <p:cNvGrpSpPr/>
+        <p:nvPr/>
+      </p:nvGrpSpPr>
+      <p:grpSpPr>
+        <a:xfrm>
+          <a:off x="0" y="0"/>
+          <a:ext cx="0" cy="0"/>
+          <a:chOff x="0" y="0"/>
+          <a:chExt cx="0" cy="0"/>
+        </a:xfrm>
+      </p:grpSpPr>
+      <p:sp>
+        <p:nvSpPr>
+          <p:cNvPr id="9" name="replaceTextBullet1">
+            <a:extLst>
+              <a:ext uri="{FF2B5EF4-FFF2-40B4-BE49-F238E27FC236}">
+                <a16:creationId xmlns:a16="http://schemas.microsoft.com/office/drawing/2014/main" id="{145AC1A0-5801-4BE8-B0E4-E02A0C611D24}"/>
+              </a:ext>
+            </a:extLst>
+          </p:cNvPr>
+          <p:cNvSpPr txBox="1"/>
+          <p:nvPr/>
+        </p:nvSpPr>
+        <p:spPr>
+          <a:xfrm>
+            <a:off x="2068830" y="1794510"/>
+            <a:ext cx="4027170" cy="923330"/>
+          </a:xfrm>
+          <a:prstGeom prst="rect">
+            <a:avLst/>
+          </a:prstGeom>
+          <a:noFill/>
+        </p:spPr>
+        <p:txBody>
+          <a:bodyPr wrap="square" rtlCol="0">
+            <a:spAutoFit/>
+          </a:bodyPr>
+          <a:lstStyle/>
+          <a:p>
+            <a:pPr marL="285750" indent="-285750">
+              <a:buFont typeface="Arial" panose="020B0604020202020204" pitchFamily="34" charset="0"/>
+              <a:buChar char="•"/>
+            </a:pPr>
+            <a:r>
+              <a:rPr lang="de-DE"/>
+              <a:t>{{bullet1}}</a:t>
+            </a:r>
+          </a:p>
+          <a:p>
+            <a:endParaRPr lang="de-DE"/>
+          </a:p>
+          <a:p>
+            <a:pPr marL="285750" indent="-285750">
+              <a:buFont typeface="Arial" panose="020B0604020202020204" pitchFamily="34" charset="0"/>
+              <a:buChar char="•"/>
+            </a:pPr>
+            <a:r>
+              <a:rPr lang="de-DE">
+                <a:solidFill>
+                  <a:schemeClr val="accent6">
+                    <a:lumMod val="60000"/>
+                    <a:lumOff val="40000"/>
+                  </a:schemeClr>
+                </a:solidFill>
+              </a:rPr>
+              <a:t>{{bullet2}}</a:t>
+            </a:r>
+          </a:p>
+        </p:txBody>
+      </p:sp>
+    </p:spTree>
+    <p:extLst>
+      <p:ext uri="{BB962C8B-B14F-4D97-AF65-F5344CB8AC3E}">
+        <p14:creationId xmlns:p14="http://schemas.microsoft.com/office/powerpoint/2010/main" val="531019532"/>
+      </p:ext>
+    </p:extLst>
+  </p:cSld>
+  <p:clrMapOvr>
+    <a:masterClrMapping/>
+  </p:clrMapOvr>
+</p:sld>
+</file>
+
 <file path=ppt/theme/theme1.xml><?xml version="1.0" encoding="utf-8"?>
 <a:theme xmlns:a="http://schemas.openxmlformats.org/drawingml/2006/main" name="Office">
   <a:themeElements>

</xml_diff>